<commit_message>
Final Path to Agility 2016 updates
</commit_message>
<xml_diff>
--- a/Effectively Documenting your Development Project - Path to Agility 2016.pptx
+++ b/Effectively Documenting your Development Project - Path to Agility 2016.pptx
@@ -4788,11 +4788,7 @@
             </a:r>
             <a:r>
               <a:rPr lang="en-US" dirty="0" smtClean="0"/>
-              <a:t>, proprietary</a:t>
-            </a:r>
-            <a:r>
-              <a:rPr lang="en-US" dirty="0" smtClean="0"/>
-              <a:t>?</a:t>
+              <a:t>, proprietary?</a:t>
             </a:r>
           </a:p>
           <a:p>
@@ -5055,13 +5051,8 @@
             </a:r>
             <a:r>
               <a:rPr lang="en-US" dirty="0" smtClean="0"/>
-              <a:t>encountered problems</a:t>
-            </a:r>
-            <a:r>
-              <a:rPr lang="en-US" dirty="0" smtClean="0"/>
-              <a:t>.</a:t>
-            </a:r>
-            <a:endParaRPr lang="en-US" dirty="0" smtClean="0"/>
+              <a:t>encountered problems.</a:t>
+            </a:r>
           </a:p>
         </p:txBody>
       </p:sp>
@@ -5144,22 +5135,13 @@
           <a:p>
             <a:r>
               <a:rPr lang="en-US" dirty="0" smtClean="0"/>
-              <a:t>Project architect writes </a:t>
-            </a:r>
-            <a:r>
-              <a:rPr lang="en-US" dirty="0" smtClean="0"/>
-              <a:t>it</a:t>
-            </a:r>
-            <a:endParaRPr lang="en-US" dirty="0" smtClean="0"/>
-          </a:p>
-          <a:p>
-            <a:r>
-              <a:rPr lang="en-US" dirty="0" smtClean="0"/>
-              <a:t>Entire development team </a:t>
-            </a:r>
-            <a:r>
-              <a:rPr lang="en-US" dirty="0" smtClean="0"/>
-              <a:t>owns it</a:t>
+              <a:t>Project architect writes it</a:t>
+            </a:r>
+          </a:p>
+          <a:p>
+            <a:r>
+              <a:rPr lang="en-US" dirty="0" smtClean="0"/>
+              <a:t>Entire development team owns it</a:t>
             </a:r>
           </a:p>
           <a:p>
@@ -5168,16 +5150,11 @@
               <a:rPr lang="en-US" dirty="0" smtClean="0"/>
               <a:t>Recurring task in each sprint to update it</a:t>
             </a:r>
-            <a:endParaRPr lang="en-US" dirty="0" smtClean="0"/>
-          </a:p>
-          <a:p>
-            <a:r>
-              <a:rPr lang="en-US" dirty="0" smtClean="0"/>
-              <a:t>Do not put this off until </a:t>
-            </a:r>
-            <a:r>
-              <a:rPr lang="en-US" dirty="0" smtClean="0"/>
-              <a:t>later</a:t>
+          </a:p>
+          <a:p>
+            <a:r>
+              <a:rPr lang="en-US" dirty="0" smtClean="0"/>
+              <a:t>Do not put this off until later</a:t>
             </a:r>
           </a:p>
           <a:p>
@@ -5185,7 +5162,6 @@
               <a:rPr lang="en-US" dirty="0" smtClean="0"/>
               <a:t>Don't ignore it once it's written</a:t>
             </a:r>
-            <a:endParaRPr lang="en-US" dirty="0" smtClean="0"/>
           </a:p>
           <a:p>
             <a:r>
@@ -5478,10 +5454,16 @@
               <a:rPr lang="en-US" dirty="0"/>
             </a:br>
             <a:r>
+              <a:rPr lang="en-US" dirty="0">
+                <a:hlinkClick r:id="rId4"/>
+              </a:rPr>
+              <a:t>https://</a:t>
+            </a:r>
+            <a:r>
               <a:rPr lang="en-US" dirty="0" smtClean="0">
                 <a:hlinkClick r:id="rId4"/>
               </a:rPr>
-              <a:t>https://goo.gl/qfcm5X</a:t>
+              <a:t>goo.gl/8DbkRi</a:t>
             </a:r>
             <a:endParaRPr lang="en-US" dirty="0" smtClean="0"/>
           </a:p>
@@ -5604,11 +5586,7 @@
           <a:p>
             <a:r>
               <a:rPr lang="en-US" dirty="0" smtClean="0"/>
-              <a:t>Who writes and maintains this</a:t>
-            </a:r>
-            <a:r>
-              <a:rPr lang="en-US" dirty="0" smtClean="0"/>
-              <a:t>?</a:t>
+              <a:t>Who writes and maintains this?</a:t>
             </a:r>
           </a:p>
           <a:p>
@@ -5616,7 +5594,6 @@
               <a:rPr lang="en-US" dirty="0" smtClean="0"/>
               <a:t>How do you write it?</a:t>
             </a:r>
-            <a:endParaRPr lang="en-US" dirty="0" smtClean="0"/>
           </a:p>
           <a:p>
             <a:r>
@@ -5835,11 +5812,7 @@
           <a:p>
             <a:r>
               <a:rPr lang="en-US" dirty="0" smtClean="0"/>
-              <a:t>Currently working at a client where there is little </a:t>
-            </a:r>
-            <a:r>
-              <a:rPr lang="en-US" dirty="0" smtClean="0"/>
-              <a:t>documentation</a:t>
+              <a:t>Currently working at a client where there is little documentation</a:t>
             </a:r>
           </a:p>
           <a:p>
@@ -5847,7 +5820,6 @@
               <a:rPr lang="en-US" dirty="0" smtClean="0"/>
               <a:t>Who are you?</a:t>
             </a:r>
-            <a:endParaRPr lang="en-US" dirty="0" smtClean="0"/>
           </a:p>
         </p:txBody>
       </p:sp>
@@ -6104,11 +6076,7 @@
           <a:p>
             <a:r>
               <a:rPr lang="en-US" dirty="0" smtClean="0"/>
-              <a:t>Treat documentation </a:t>
-            </a:r>
-            <a:r>
-              <a:rPr lang="en-US" dirty="0" smtClean="0"/>
-              <a:t>is part of your software deliverable</a:t>
+              <a:t>Treat documentation is part of your software deliverable</a:t>
             </a:r>
           </a:p>
           <a:p>
@@ -6413,13 +6381,8 @@
             <a:pPr lvl="1"/>
             <a:r>
               <a:rPr lang="en-US" dirty="0" smtClean="0"/>
-              <a:t>Include project owner/sponsor, PMs, BAs, developers, </a:t>
-            </a:r>
-            <a:r>
-              <a:rPr lang="en-US" dirty="0" smtClean="0"/>
-              <a:t>QA, IT support</a:t>
-            </a:r>
-            <a:endParaRPr lang="en-US" dirty="0" smtClean="0"/>
+              <a:t>Include project owner/sponsor, PMs, BAs, developers, QA, IT support</a:t>
+            </a:r>
           </a:p>
           <a:p>
             <a:pPr lvl="1"/>
@@ -6431,11 +6394,7 @@
           <a:p>
             <a:r>
               <a:rPr lang="en-US" dirty="0" smtClean="0"/>
-              <a:t>Links to project </a:t>
-            </a:r>
-            <a:r>
-              <a:rPr lang="en-US" dirty="0" smtClean="0"/>
-              <a:t>requirements</a:t>
+              <a:t>Links to project requirements</a:t>
             </a:r>
           </a:p>
           <a:p>
@@ -6443,7 +6402,6 @@
               <a:rPr lang="en-US" dirty="0" smtClean="0"/>
               <a:t>Links to architecture and design docs</a:t>
             </a:r>
-            <a:endParaRPr lang="en-US" dirty="0" smtClean="0"/>
           </a:p>
           <a:p>
             <a:r>

</xml_diff>